<commit_message>
added analysis indsp for taxo
</commit_message>
<xml_diff>
--- a/figures/figure5.pptx
+++ b/figures/figure5.pptx
@@ -4523,10 +4523,10 @@
           <a:lstStyle/>
           <a:p>
             <a:r>
-              <a:rPr lang="fr-CA" b="1" dirty="0"/>
+              <a:rPr lang="fr-CA" dirty="0"/>
               <a:t>A</a:t>
             </a:r>
-            <a:endParaRPr lang="en-CA" b="1" dirty="0"/>
+            <a:endParaRPr lang="en-CA" dirty="0"/>
           </a:p>
         </p:txBody>
       </p:sp>
@@ -4559,10 +4559,10 @@
           <a:lstStyle/>
           <a:p>
             <a:r>
-              <a:rPr lang="fr-CA" b="1" dirty="0"/>
+              <a:rPr lang="fr-CA" dirty="0"/>
               <a:t>B</a:t>
             </a:r>
-            <a:endParaRPr lang="en-CA" b="1" dirty="0"/>
+            <a:endParaRPr lang="en-CA" dirty="0"/>
           </a:p>
         </p:txBody>
       </p:sp>

</xml_diff>